<commit_message>
Update version of file
</commit_message>
<xml_diff>
--- a/energy.pptx
+++ b/energy.pptx
@@ -69,7 +69,7 @@
         <p:txBody>
           <a:bodyPr/>
           <a:p>
-            <a:fld id="{510B4B8D-4A49-4435-806E-E2B8DE91C3F9}" type="slidenum">
+            <a:fld id="{EE4DD1E2-A550-444D-A0BB-8D44EAD69524}" type="slidenum">
               <a:t>&lt;#&gt;</a:t>
             </a:fld>
           </a:p>
@@ -278,7 +278,7 @@
         <p:txBody>
           <a:bodyPr/>
           <a:p>
-            <a:fld id="{C0519111-08AB-4D51-8CAA-D8A9CB010E1A}" type="slidenum">
+            <a:fld id="{D323BB02-A8E5-41DA-A8E2-947A1ED15AFE}" type="slidenum">
               <a:t>&lt;#&gt;</a:t>
             </a:fld>
           </a:p>
@@ -573,7 +573,7 @@
         <p:txBody>
           <a:bodyPr/>
           <a:p>
-            <a:fld id="{B15B9E13-2398-4CC4-A73E-8969EA940592}" type="slidenum">
+            <a:fld id="{70D7D99C-6143-4295-83CE-D0B34B5751A9}" type="slidenum">
               <a:t>&lt;#&gt;</a:t>
             </a:fld>
           </a:p>
@@ -954,7 +954,7 @@
         <p:txBody>
           <a:bodyPr/>
           <a:p>
-            <a:fld id="{48DA76B5-A1E1-4CAB-BE50-1F89111E866D}" type="slidenum">
+            <a:fld id="{8B6AC469-8AC9-4DC1-9054-907033438A40}" type="slidenum">
               <a:t>&lt;#&gt;</a:t>
             </a:fld>
           </a:p>
@@ -1117,7 +1117,7 @@
         <p:txBody>
           <a:bodyPr/>
           <a:p>
-            <a:fld id="{867A5677-65E2-4B73-91DE-6E753C07FD51}" type="slidenum">
+            <a:fld id="{73E24CA2-17FF-4DC7-AFE0-75F77CF99A25}" type="slidenum">
               <a:t>&lt;#&gt;</a:t>
             </a:fld>
           </a:p>
@@ -1283,7 +1283,7 @@
         <p:txBody>
           <a:bodyPr/>
           <a:p>
-            <a:fld id="{EFC1B1FF-CC3E-4941-8824-B0011FE2701F}" type="slidenum">
+            <a:fld id="{53E2F665-D827-42EC-8543-D5F3B45357D7}" type="slidenum">
               <a:t>&lt;#&gt;</a:t>
             </a:fld>
           </a:p>
@@ -1492,7 +1492,7 @@
         <p:txBody>
           <a:bodyPr/>
           <a:p>
-            <a:fld id="{1D0025C8-1F06-4AFF-921E-8858E2374734}" type="slidenum">
+            <a:fld id="{B8D18F1B-9D53-43FB-8C23-BCD37B5CB5D9}" type="slidenum">
               <a:t>&lt;#&gt;</a:t>
             </a:fld>
           </a:p>
@@ -1615,7 +1615,7 @@
         <p:txBody>
           <a:bodyPr/>
           <a:p>
-            <a:fld id="{09E5B79F-2ADA-412E-AF32-268126EB65AA}" type="slidenum">
+            <a:fld id="{8E58AD79-5173-44E4-8694-ECDAE759AFA2}" type="slidenum">
               <a:t>&lt;#&gt;</a:t>
             </a:fld>
           </a:p>
@@ -1736,7 +1736,7 @@
         <p:txBody>
           <a:bodyPr/>
           <a:p>
-            <a:fld id="{59AE43CB-080B-4BD4-A284-B3725EEA6B93}" type="slidenum">
+            <a:fld id="{F1CF2D9D-35CD-4F2C-A6B7-29AA42AEBECB}" type="slidenum">
               <a:t>&lt;#&gt;</a:t>
             </a:fld>
           </a:p>
@@ -1988,7 +1988,7 @@
         <p:txBody>
           <a:bodyPr/>
           <a:p>
-            <a:fld id="{61A1325E-2D1A-4787-B629-173C593F2ED0}" type="slidenum">
+            <a:fld id="{73AECB7C-D748-4389-9930-9608E4A175E1}" type="slidenum">
               <a:t>&lt;#&gt;</a:t>
             </a:fld>
           </a:p>
@@ -2240,7 +2240,7 @@
         <p:txBody>
           <a:bodyPr/>
           <a:p>
-            <a:fld id="{F5390B0E-1F50-47A0-AD3A-68BF108BEC9A}" type="slidenum">
+            <a:fld id="{9DBC011B-5622-4D44-85AF-82EA8E111809}" type="slidenum">
               <a:t>&lt;#&gt;</a:t>
             </a:fld>
           </a:p>
@@ -2492,7 +2492,7 @@
         <p:txBody>
           <a:bodyPr/>
           <a:p>
-            <a:fld id="{84533DB3-4742-4BCA-B613-AA66D788FAA8}" type="slidenum">
+            <a:fld id="{5CFC3B66-1A03-4C19-9512-430E0665CAB9}" type="slidenum">
               <a:t>&lt;#&gt;</a:t>
             </a:fld>
           </a:p>
@@ -2977,7 +2977,7 @@
             <a:pPr indent="0" algn="r">
               <a:buNone/>
             </a:pPr>
-            <a:fld id="{F7AE511C-85E1-4C3F-840B-3ADAC403F7BE}" type="slidenum">
+            <a:fld id="{49467B8A-79CE-4824-A27A-93E6971A24F0}" type="slidenum">
               <a:rPr b="0" lang="en-US" sz="1400" spc="-1" strike="noStrike">
                 <a:solidFill>
                   <a:srgbClr val="000000"/>
@@ -3056,7 +3056,7 @@
                 <a:srgbClr val="00a933"/>
               </a:gs>
               <a:gs pos="100000">
-                <a:srgbClr val="ffff38"/>
+                <a:srgbClr val="ffff6d"/>
               </a:gs>
             </a:gsLst>
             <a:lin ang="3600000"/>
@@ -3080,7 +3080,7 @@
                 </a:solidFill>
                 <a:latin typeface="Arial"/>
               </a:rPr>
-              <a:t>Biofuel Energy Usage in 2021</a:t>
+              <a:t>Biofuel Power Usage In 2021</a:t>
             </a:r>
             <a:endParaRPr b="0" lang="en-US" sz="4400" spc="-1" strike="noStrike">
               <a:solidFill>
@@ -3103,8 +3103,8 @@
         </p:blipFill>
         <p:spPr>
           <a:xfrm>
-            <a:off x="457200" y="1586880"/>
-            <a:ext cx="4343400" cy="3670920"/>
+            <a:off x="0" y="1256760"/>
+            <a:ext cx="4413240" cy="4413240"/>
           </a:xfrm>
           <a:prstGeom prst="rect">
             <a:avLst/>
@@ -3126,8 +3126,8 @@
         </p:blipFill>
         <p:spPr>
           <a:xfrm>
-            <a:off x="4800600" y="1600200"/>
-            <a:ext cx="5029200" cy="3225600"/>
+            <a:off x="4572000" y="1600200"/>
+            <a:ext cx="5508000" cy="3442320"/>
           </a:xfrm>
           <a:prstGeom prst="rect">
             <a:avLst/>
@@ -3191,7 +3191,7 @@
                 <a:srgbClr val="00a933"/>
               </a:gs>
               <a:gs pos="100000">
-                <a:srgbClr val="ffff38"/>
+                <a:srgbClr val="ffff6d"/>
               </a:gs>
             </a:gsLst>
             <a:lin ang="3600000"/>
@@ -3215,7 +3215,7 @@
                 </a:solidFill>
                 <a:latin typeface="Arial"/>
               </a:rPr>
-              <a:t>Hydro Energy Usage in 2021</a:t>
+              <a:t>Hydro Power Usage In 2021</a:t>
             </a:r>
             <a:endParaRPr b="0" lang="en-US" sz="4400" spc="-1" strike="noStrike">
               <a:solidFill>
@@ -3238,8 +3238,8 @@
         </p:blipFill>
         <p:spPr>
           <a:xfrm>
-            <a:off x="300600" y="1551600"/>
-            <a:ext cx="4644000" cy="3459240"/>
+            <a:off x="0" y="1256760"/>
+            <a:ext cx="4413240" cy="4413240"/>
           </a:xfrm>
           <a:prstGeom prst="rect">
             <a:avLst/>
@@ -3261,8 +3261,8 @@
         </p:blipFill>
         <p:spPr>
           <a:xfrm>
-            <a:off x="4944600" y="1720800"/>
-            <a:ext cx="5113800" cy="2874600"/>
+            <a:off x="4572000" y="1600200"/>
+            <a:ext cx="5508000" cy="3442320"/>
           </a:xfrm>
           <a:prstGeom prst="rect">
             <a:avLst/>
@@ -3326,7 +3326,7 @@
                 <a:srgbClr val="00a933"/>
               </a:gs>
               <a:gs pos="100000">
-                <a:srgbClr val="ffff38"/>
+                <a:srgbClr val="ffff6d"/>
               </a:gs>
             </a:gsLst>
             <a:lin ang="3600000"/>
@@ -3350,7 +3350,7 @@
                 </a:solidFill>
                 <a:latin typeface="Arial"/>
               </a:rPr>
-              <a:t>Solar Energy Usage in 2021</a:t>
+              <a:t>Solar Power Usage In 2021</a:t>
             </a:r>
             <a:endParaRPr b="0" lang="en-US" sz="4400" spc="-1" strike="noStrike">
               <a:solidFill>
@@ -3373,8 +3373,8 @@
         </p:blipFill>
         <p:spPr>
           <a:xfrm>
-            <a:off x="457200" y="1542600"/>
-            <a:ext cx="4343400" cy="3288240"/>
+            <a:off x="0" y="1256760"/>
+            <a:ext cx="4413240" cy="4413240"/>
           </a:xfrm>
           <a:prstGeom prst="rect">
             <a:avLst/>
@@ -3396,8 +3396,8 @@
         </p:blipFill>
         <p:spPr>
           <a:xfrm>
-            <a:off x="4800600" y="1587240"/>
-            <a:ext cx="5029200" cy="2756160"/>
+            <a:off x="4572000" y="1600200"/>
+            <a:ext cx="5508000" cy="3442320"/>
           </a:xfrm>
           <a:prstGeom prst="rect">
             <a:avLst/>
@@ -3461,7 +3461,7 @@
                 <a:srgbClr val="00a933"/>
               </a:gs>
               <a:gs pos="100000">
-                <a:srgbClr val="ffff38"/>
+                <a:srgbClr val="ffff6d"/>
               </a:gs>
             </a:gsLst>
             <a:lin ang="3600000"/>
@@ -3485,7 +3485,7 @@
                 </a:solidFill>
                 <a:latin typeface="Arial"/>
               </a:rPr>
-              <a:t>Wind Energy Usage in 2021</a:t>
+              <a:t>Wind Power Usage In 2021</a:t>
             </a:r>
             <a:endParaRPr b="0" lang="en-US" sz="4400" spc="-1" strike="noStrike">
               <a:solidFill>
@@ -3508,8 +3508,8 @@
         </p:blipFill>
         <p:spPr>
           <a:xfrm>
-            <a:off x="385200" y="1542600"/>
-            <a:ext cx="4343400" cy="3288240"/>
+            <a:off x="0" y="1256760"/>
+            <a:ext cx="4413240" cy="4413240"/>
           </a:xfrm>
           <a:prstGeom prst="rect">
             <a:avLst/>
@@ -3531,8 +3531,8 @@
         </p:blipFill>
         <p:spPr>
           <a:xfrm>
-            <a:off x="4800600" y="1586880"/>
-            <a:ext cx="5029200" cy="2766600"/>
+            <a:off x="4572000" y="1600200"/>
+            <a:ext cx="5508000" cy="3442320"/>
           </a:xfrm>
           <a:prstGeom prst="rect">
             <a:avLst/>
@@ -3593,10 +3593,10 @@
           <a:gradFill rotWithShape="0">
             <a:gsLst>
               <a:gs pos="0">
-                <a:srgbClr val="666666"/>
+                <a:srgbClr val="808080"/>
               </a:gs>
               <a:gs pos="100000">
-                <a:srgbClr val="ea7500"/>
+                <a:srgbClr val="ff860d"/>
               </a:gs>
             </a:gsLst>
             <a:lin ang="3600000"/>
@@ -3620,7 +3620,7 @@
                 </a:solidFill>
                 <a:latin typeface="Arial"/>
               </a:rPr>
-              <a:t>Coal Usage In 2021</a:t>
+              <a:t>Coal Power Usage In 2021</a:t>
             </a:r>
             <a:endParaRPr b="0" lang="en-US" sz="4400" spc="-1" strike="noStrike">
               <a:solidFill>
@@ -3643,8 +3643,8 @@
         </p:blipFill>
         <p:spPr>
           <a:xfrm>
-            <a:off x="385200" y="1542600"/>
-            <a:ext cx="4343400" cy="3288240"/>
+            <a:off x="0" y="1256760"/>
+            <a:ext cx="4413240" cy="4413240"/>
           </a:xfrm>
           <a:prstGeom prst="rect">
             <a:avLst/>
@@ -3666,8 +3666,8 @@
         </p:blipFill>
         <p:spPr>
           <a:xfrm>
-            <a:off x="4800600" y="1587240"/>
-            <a:ext cx="5029200" cy="2766600"/>
+            <a:off x="4572000" y="1600200"/>
+            <a:ext cx="5508000" cy="3442320"/>
           </a:xfrm>
           <a:prstGeom prst="rect">
             <a:avLst/>
@@ -3728,10 +3728,10 @@
           <a:gradFill rotWithShape="0">
             <a:gsLst>
               <a:gs pos="0">
-                <a:srgbClr val="666666"/>
+                <a:srgbClr val="808080"/>
               </a:gs>
               <a:gs pos="100000">
-                <a:srgbClr val="ea7500"/>
+                <a:srgbClr val="ff860d"/>
               </a:gs>
             </a:gsLst>
             <a:lin ang="3600000"/>
@@ -3755,7 +3755,7 @@
                 </a:solidFill>
                 <a:latin typeface="Arial"/>
               </a:rPr>
-              <a:t>Natural Gas Usage In 2021</a:t>
+              <a:t>Gas Power Usage In 2021</a:t>
             </a:r>
             <a:endParaRPr b="0" lang="en-US" sz="4400" spc="-1" strike="noStrike">
               <a:solidFill>
@@ -3778,8 +3778,8 @@
         </p:blipFill>
         <p:spPr>
           <a:xfrm>
-            <a:off x="457200" y="1542600"/>
-            <a:ext cx="4343400" cy="3288240"/>
+            <a:off x="0" y="1256760"/>
+            <a:ext cx="4413240" cy="4413240"/>
           </a:xfrm>
           <a:prstGeom prst="rect">
             <a:avLst/>
@@ -3801,8 +3801,8 @@
         </p:blipFill>
         <p:spPr>
           <a:xfrm>
-            <a:off x="4800600" y="1586880"/>
-            <a:ext cx="5257800" cy="2766600"/>
+            <a:off x="4572000" y="1600200"/>
+            <a:ext cx="5508000" cy="3442320"/>
           </a:xfrm>
           <a:prstGeom prst="rect">
             <a:avLst/>
@@ -3863,10 +3863,10 @@
           <a:gradFill rotWithShape="0">
             <a:gsLst>
               <a:gs pos="0">
-                <a:srgbClr val="666666"/>
+                <a:srgbClr val="808080"/>
               </a:gs>
               <a:gs pos="100000">
-                <a:srgbClr val="ea7500"/>
+                <a:srgbClr val="ff860d"/>
               </a:gs>
             </a:gsLst>
             <a:lin ang="3600000"/>
@@ -3890,7 +3890,7 @@
                 </a:solidFill>
                 <a:latin typeface="Arial"/>
               </a:rPr>
-              <a:t>Oil Usage In 2021</a:t>
+              <a:t>Oil Power Usage In 2021</a:t>
             </a:r>
             <a:endParaRPr b="0" lang="en-US" sz="4400" spc="-1" strike="noStrike">
               <a:solidFill>
@@ -3913,8 +3913,8 @@
         </p:blipFill>
         <p:spPr>
           <a:xfrm>
-            <a:off x="457200" y="1506600"/>
-            <a:ext cx="4343400" cy="3288240"/>
+            <a:off x="0" y="1256760"/>
+            <a:ext cx="4413240" cy="4413240"/>
           </a:xfrm>
           <a:prstGeom prst="rect">
             <a:avLst/>
@@ -3936,8 +3936,8 @@
         </p:blipFill>
         <p:spPr>
           <a:xfrm>
-            <a:off x="4849200" y="1587240"/>
-            <a:ext cx="5209200" cy="2766600"/>
+            <a:off x="4572000" y="1600200"/>
+            <a:ext cx="5508000" cy="3442320"/>
           </a:xfrm>
           <a:prstGeom prst="rect">
             <a:avLst/>

</xml_diff>